<commit_message>
Added Challenge and Presentation to W10-S3
</commit_message>
<xml_diff>
--- a/week-10/W10-S3-TailwindGroupChallenge/W10-S3-TailwindGroupChallenge.pptx
+++ b/week-10/W10-S3-TailwindGroupChallenge/W10-S3-TailwindGroupChallenge.pptx
@@ -5,10 +5,10 @@
     <p:sldMasterId id="2147483968" r:id="rId1"/>
   </p:sldMasterIdLst>
   <p:notesMasterIdLst>
-    <p:notesMasterId r:id="rId14"/>
+    <p:notesMasterId r:id="rId15"/>
   </p:notesMasterIdLst>
   <p:handoutMasterIdLst>
-    <p:handoutMasterId r:id="rId15"/>
+    <p:handoutMasterId r:id="rId16"/>
   </p:handoutMasterIdLst>
   <p:sldIdLst>
     <p:sldId id="256" r:id="rId2"/>
@@ -20,9 +20,10 @@
     <p:sldId id="287" r:id="rId8"/>
     <p:sldId id="269" r:id="rId9"/>
     <p:sldId id="288" r:id="rId10"/>
-    <p:sldId id="289" r:id="rId11"/>
-    <p:sldId id="292" r:id="rId12"/>
-    <p:sldId id="264" r:id="rId13"/>
+    <p:sldId id="297" r:id="rId11"/>
+    <p:sldId id="298" r:id="rId12"/>
+    <p:sldId id="292" r:id="rId13"/>
+    <p:sldId id="264" r:id="rId14"/>
   </p:sldIdLst>
   <p:sldSz cx="12192000" cy="6858000"/>
   <p:notesSz cx="6858000" cy="9144000"/>
@@ -135,7 +136,8 @@
             <p14:sldId id="287"/>
             <p14:sldId id="269"/>
             <p14:sldId id="288"/>
-            <p14:sldId id="289"/>
+            <p14:sldId id="297"/>
+            <p14:sldId id="298"/>
             <p14:sldId id="292"/>
             <p14:sldId id="264"/>
           </p14:sldIdLst>
@@ -449,7 +451,7 @@
           <a:p>
             <a:fld id="{AA884A5F-B9F5-9B43-BE5B-EBBCD5646595}" type="datetimeFigureOut">
               <a:rPr lang="en-US" smtClean="0"/>
-              <a:t>11/10/24</a:t>
+              <a:t>11/17/24</a:t>
             </a:fld>
             <a:endParaRPr lang="en-US"/>
           </a:p>
@@ -1370,7 +1372,7 @@
           <a:p>
             <a:fld id="{F6FA2B21-3FCD-4721-B95C-427943F61125}" type="datetime1">
               <a:rPr lang="en-US" smtClean="0"/>
-              <a:t>11/10/24</a:t>
+              <a:t>11/17/24</a:t>
             </a:fld>
             <a:endParaRPr lang="en-US"/>
           </a:p>
@@ -1633,7 +1635,7 @@
           <a:p>
             <a:fld id="{F6FA2B21-3FCD-4721-B95C-427943F61125}" type="datetime1">
               <a:rPr lang="en-US" smtClean="0"/>
-              <a:t>11/10/24</a:t>
+              <a:t>11/17/24</a:t>
             </a:fld>
             <a:endParaRPr lang="en-US"/>
           </a:p>
@@ -1869,7 +1871,7 @@
           <a:p>
             <a:fld id="{F6FA2B21-3FCD-4721-B95C-427943F61125}" type="datetime1">
               <a:rPr lang="en-US" smtClean="0"/>
-              <a:t>11/10/24</a:t>
+              <a:t>11/17/24</a:t>
             </a:fld>
             <a:endParaRPr lang="en-US"/>
           </a:p>
@@ -2197,7 +2199,7 @@
           <a:p>
             <a:fld id="{EA0C0817-A112-4847-8014-A94B7D2A4EA3}" type="datetime1">
               <a:rPr lang="en-US" smtClean="0"/>
-              <a:t>11/10/24</a:t>
+              <a:t>11/17/24</a:t>
             </a:fld>
             <a:endParaRPr lang="en-US" dirty="0"/>
           </a:p>
@@ -2511,7 +2513,7 @@
           <a:p>
             <a:fld id="{7332B432-ACDA-4023-A761-2BAB76577B62}" type="datetime1">
               <a:rPr lang="en-US" smtClean="0"/>
-              <a:t>11/10/24</a:t>
+              <a:t>11/17/24</a:t>
             </a:fld>
             <a:endParaRPr lang="en-US"/>
           </a:p>
@@ -2818,7 +2820,7 @@
           <a:p>
             <a:fld id="{D9C646AA-F36E-4540-911D-FFFC0A0EF24A}" type="datetime1">
               <a:rPr lang="en-US" smtClean="0"/>
-              <a:t>11/10/24</a:t>
+              <a:t>11/17/24</a:t>
             </a:fld>
             <a:endParaRPr lang="en-US" dirty="0"/>
           </a:p>
@@ -3120,7 +3122,7 @@
           <a:p>
             <a:fld id="{69186D26-FA5F-4637-B602-B7C2DC34CFD4}" type="datetime1">
               <a:rPr lang="en-US" smtClean="0"/>
-              <a:t>11/10/24</a:t>
+              <a:t>11/17/24</a:t>
             </a:fld>
             <a:endParaRPr lang="en-US"/>
           </a:p>
@@ -3542,7 +3544,7 @@
           <a:p>
             <a:fld id="{8A7F15D8-96D1-4781-BC50-CA8A088B2FE4}" type="datetime1">
               <a:rPr lang="en-US" smtClean="0"/>
-              <a:t>11/10/24</a:t>
+              <a:t>11/17/24</a:t>
             </a:fld>
             <a:endParaRPr lang="en-US"/>
           </a:p>
@@ -3704,7 +3706,7 @@
           <a:p>
             <a:fld id="{F9A96C99-B8F8-4528-BD05-0E16E943DC09}" type="datetime1">
               <a:rPr lang="en-US" smtClean="0"/>
-              <a:t>11/10/24</a:t>
+              <a:t>11/17/24</a:t>
             </a:fld>
             <a:endParaRPr lang="en-US"/>
           </a:p>
@@ -3799,7 +3801,7 @@
           <a:p>
             <a:fld id="{03636942-C211-4B28-8DBD-C953E00AF71B}" type="datetime1">
               <a:rPr lang="en-US" smtClean="0"/>
-              <a:t>11/10/24</a:t>
+              <a:t>11/17/24</a:t>
             </a:fld>
             <a:endParaRPr lang="en-US"/>
           </a:p>
@@ -4177,7 +4179,7 @@
           <a:p>
             <a:fld id="{7E8D12A6-918A-48BD-8CB9-CA713993B0EA}" type="datetime1">
               <a:rPr lang="en-US" smtClean="0"/>
-              <a:t>11/10/24</a:t>
+              <a:t>11/17/24</a:t>
             </a:fld>
             <a:endParaRPr lang="en-US"/>
           </a:p>
@@ -4466,7 +4468,7 @@
           <a:p>
             <a:fld id="{F6FA2B21-3FCD-4721-B95C-427943F61125}" type="datetime1">
               <a:rPr lang="en-US" smtClean="0"/>
-              <a:t>11/10/24</a:t>
+              <a:t>11/17/24</a:t>
             </a:fld>
             <a:endParaRPr lang="en-US"/>
           </a:p>
@@ -4678,7 +4680,7 @@
           <a:p>
             <a:fld id="{F6FA2B21-3FCD-4721-B95C-427943F61125}" type="datetime1">
               <a:rPr lang="en-US" smtClean="0"/>
-              <a:t>11/10/24</a:t>
+              <a:t>11/17/24</a:t>
             </a:fld>
             <a:endParaRPr lang="en-US"/>
           </a:p>
@@ -5382,13 +5384,8 @@
                   <a:schemeClr val="tx1"/>
                 </a:solidFill>
               </a:rPr>
-              <a:t>Introducing React</a:t>
-            </a:r>
-            <a:endParaRPr lang="en-US" sz="4000" dirty="0">
-              <a:solidFill>
-                <a:schemeClr val="tx1"/>
-              </a:solidFill>
-            </a:endParaRPr>
+              <a:t>Group App Tailwind and React Challenge</a:t>
+            </a:r>
           </a:p>
         </p:txBody>
       </p:sp>
@@ -5453,7 +5450,7 @@
         <p:cNvPr id="1" name="">
           <a:extLst>
             <a:ext uri="{FF2B5EF4-FFF2-40B4-BE49-F238E27FC236}">
-              <a16:creationId xmlns:a16="http://schemas.microsoft.com/office/drawing/2014/main" id="{B4BBCFAD-AB74-790B-C28F-CC6646FE3744}"/>
+              <a16:creationId xmlns:a16="http://schemas.microsoft.com/office/drawing/2014/main" id="{287E8EFB-C4B3-BFFF-DE6B-4FED7E86BA4F}"/>
             </a:ext>
           </a:extLst>
         </p:cNvPr>
@@ -5473,7 +5470,7 @@
           <p:cNvPr id="2" name="Title 1">
             <a:extLst>
               <a:ext uri="{FF2B5EF4-FFF2-40B4-BE49-F238E27FC236}">
-                <a16:creationId xmlns:a16="http://schemas.microsoft.com/office/drawing/2014/main" id="{0F51729B-E9F3-ED10-8134-49B2A015B911}"/>
+                <a16:creationId xmlns:a16="http://schemas.microsoft.com/office/drawing/2014/main" id="{FB03E096-59DF-EF5B-DAA5-5906DAA8A0E8}"/>
               </a:ext>
             </a:extLst>
           </p:cNvPr>
@@ -5498,7 +5495,7 @@
           <a:p>
             <a:r>
               <a:rPr lang="en-GB" dirty="0"/>
-              <a:t>Components and Props</a:t>
+              <a:t>Getting started</a:t>
             </a:r>
           </a:p>
         </p:txBody>
@@ -5508,7 +5505,7 @@
           <p:cNvPr id="3" name="Content Placeholder 2">
             <a:extLst>
               <a:ext uri="{FF2B5EF4-FFF2-40B4-BE49-F238E27FC236}">
-                <a16:creationId xmlns:a16="http://schemas.microsoft.com/office/drawing/2014/main" id="{582D4F13-686A-C501-DCC7-9DE01A2F4267}"/>
+                <a16:creationId xmlns:a16="http://schemas.microsoft.com/office/drawing/2014/main" id="{70FACE03-50B9-7D9B-FFEB-4A0772C10083}"/>
               </a:ext>
             </a:extLst>
           </p:cNvPr>
@@ -5531,125 +5528,71 @@
           </a:bodyPr>
           <a:lstStyle/>
           <a:p>
-            <a:r>
-              <a:rPr lang="en-GB" b="1" dirty="0"/>
-              <a:t>Components</a:t>
-            </a:r>
-            <a:r>
-              <a:rPr lang="en-GB" dirty="0"/>
-              <a:t>: </a:t>
-            </a:r>
-            <a:br>
-              <a:rPr lang="en-GB" dirty="0"/>
-            </a:br>
-            <a:r>
-              <a:rPr lang="en-GB" dirty="0"/>
-              <a:t>Building blocks of a React app. Can be functional or class-based.</a:t>
-            </a:r>
-          </a:p>
-          <a:p>
-            <a:r>
-              <a:rPr lang="en-GB" b="1" dirty="0"/>
-              <a:t>Props</a:t>
-            </a:r>
-            <a:r>
-              <a:rPr lang="en-GB" dirty="0"/>
-              <a:t>: </a:t>
-            </a:r>
-            <a:br>
-              <a:rPr lang="en-GB" dirty="0"/>
-            </a:br>
-            <a:r>
-              <a:rPr lang="en-GB" dirty="0"/>
-              <a:t>Short for “properties,” used to pass data from one component to another.</a:t>
-            </a:r>
-          </a:p>
-          <a:p>
             <a:pPr>
               <a:buFont typeface="Arial" panose="020B0604020202020204" pitchFamily="34" charset="0"/>
               <a:buChar char="•"/>
             </a:pPr>
             <a:r>
               <a:rPr lang="en-GB" b="1" dirty="0"/>
-              <a:t>Usage:</a:t>
+              <a:t>Build the Application:</a:t>
             </a:r>
             <a:br>
               <a:rPr lang="en-GB" b="1" dirty="0"/>
             </a:br>
+            <a:br>
+              <a:rPr lang="en-GB" b="1" dirty="0"/>
+            </a:br>
             <a:r>
               <a:rPr lang="en-GB" dirty="0"/>
-              <a:t>Here, name="Alice" is a prop passed to the Greeting component.</a:t>
-            </a:r>
-          </a:p>
-          <a:p>
-            <a:endParaRPr lang="en-GB" dirty="0"/>
-          </a:p>
-        </p:txBody>
-      </p:sp>
-      <p:pic>
-        <p:nvPicPr>
-          <p:cNvPr id="6" name="Picture 5" descr="A black background with white text&#10;&#10;Description automatically generated">
-            <a:extLst>
-              <a:ext uri="{FF2B5EF4-FFF2-40B4-BE49-F238E27FC236}">
-                <a16:creationId xmlns:a16="http://schemas.microsoft.com/office/drawing/2014/main" id="{A6AC0DD5-4035-2DEB-8534-B8920E5FBAE5}"/>
-              </a:ext>
-            </a:extLst>
-          </p:cNvPr>
-          <p:cNvPicPr>
-            <a:picLocks noChangeAspect="1"/>
-          </p:cNvPicPr>
-          <p:nvPr/>
-        </p:nvPicPr>
-        <p:blipFill>
-          <a:blip r:embed="rId2"/>
-          <a:stretch>
-            <a:fillRect/>
-          </a:stretch>
-        </p:blipFill>
-        <p:spPr>
-          <a:xfrm>
-            <a:off x="6702991" y="2557745"/>
-            <a:ext cx="4648200" cy="1104900"/>
-          </a:xfrm>
-          <a:prstGeom prst="rect">
-            <a:avLst/>
-          </a:prstGeom>
-        </p:spPr>
-      </p:pic>
-      <p:pic>
-        <p:nvPicPr>
-          <p:cNvPr id="8" name="Picture 7">
-            <a:extLst>
-              <a:ext uri="{FF2B5EF4-FFF2-40B4-BE49-F238E27FC236}">
-                <a16:creationId xmlns:a16="http://schemas.microsoft.com/office/drawing/2014/main" id="{955D2B41-8BB4-8993-DDBE-71B3A187198C}"/>
-              </a:ext>
-            </a:extLst>
-          </p:cNvPr>
-          <p:cNvPicPr>
-            <a:picLocks noChangeAspect="1"/>
-          </p:cNvPicPr>
-          <p:nvPr/>
-        </p:nvPicPr>
-        <p:blipFill>
-          <a:blip r:embed="rId3"/>
-          <a:stretch>
-            <a:fillRect/>
-          </a:stretch>
-        </p:blipFill>
-        <p:spPr>
-          <a:xfrm>
-            <a:off x="6702991" y="4502401"/>
-            <a:ext cx="3251200" cy="596900"/>
-          </a:xfrm>
-          <a:prstGeom prst="rect">
-            <a:avLst/>
-          </a:prstGeom>
-        </p:spPr>
-      </p:pic>
+              <a:t>Use Material Tailwind for scaffolding.</a:t>
+            </a:r>
+          </a:p>
+          <a:p>
+            <a:pPr>
+              <a:buFont typeface="Arial" panose="020B0604020202020204" pitchFamily="34" charset="0"/>
+              <a:buChar char="•"/>
+            </a:pPr>
+            <a:r>
+              <a:rPr lang="en-GB" dirty="0"/>
+              <a:t>Implement at least one core feature.</a:t>
+            </a:r>
+          </a:p>
+          <a:p>
+            <a:pPr>
+              <a:buFont typeface="Arial" panose="020B0604020202020204" pitchFamily="34" charset="0"/>
+              <a:buChar char="•"/>
+            </a:pPr>
+            <a:r>
+              <a:rPr lang="en-GB" dirty="0"/>
+              <a:t>Test for functionality and responsiveness.</a:t>
+            </a:r>
+          </a:p>
+          <a:p>
+            <a:pPr>
+              <a:buFont typeface="Arial" panose="020B0604020202020204" pitchFamily="34" charset="0"/>
+              <a:buChar char="•"/>
+            </a:pPr>
+            <a:r>
+              <a:rPr lang="en-GB" b="1" dirty="0"/>
+              <a:t>Prepare to Present:</a:t>
+            </a:r>
+            <a:br>
+              <a:rPr lang="en-GB" b="1" dirty="0"/>
+            </a:br>
+            <a:br>
+              <a:rPr lang="en-GB" b="1" dirty="0"/>
+            </a:br>
+            <a:r>
+              <a:rPr lang="en-GB" dirty="0"/>
+              <a:t>Showcase your app and discuss contributions.</a:t>
+            </a:r>
+          </a:p>
+        </p:txBody>
+      </p:sp>
     </p:spTree>
     <p:extLst>
       <p:ext uri="{BB962C8B-B14F-4D97-AF65-F5344CB8AC3E}">
-        <p14:creationId xmlns:p14="http://schemas.microsoft.com/office/powerpoint/2010/main" val="2961728623"/>
+        <p14:creationId xmlns:p14="http://schemas.microsoft.com/office/powerpoint/2010/main" val="989080723"/>
       </p:ext>
     </p:extLst>
   </p:cSld>
@@ -5660,6 +5603,136 @@
 </file>
 
 <file path=ppt/slides/slide11.xml><?xml version="1.0" encoding="utf-8"?>
+<p:sld xmlns:a="http://schemas.openxmlformats.org/drawingml/2006/main" xmlns:r="http://schemas.openxmlformats.org/officeDocument/2006/relationships" xmlns:p="http://schemas.openxmlformats.org/presentationml/2006/main">
+  <p:cSld>
+    <p:spTree>
+      <p:nvGrpSpPr>
+        <p:cNvPr id="1" name="">
+          <a:extLst>
+            <a:ext uri="{FF2B5EF4-FFF2-40B4-BE49-F238E27FC236}">
+              <a16:creationId xmlns:a16="http://schemas.microsoft.com/office/drawing/2014/main" id="{8CBB8B85-918B-5389-428D-2A5ED1122931}"/>
+            </a:ext>
+          </a:extLst>
+        </p:cNvPr>
+        <p:cNvGrpSpPr/>
+        <p:nvPr/>
+      </p:nvGrpSpPr>
+      <p:grpSpPr>
+        <a:xfrm>
+          <a:off x="0" y="0"/>
+          <a:ext cx="0" cy="0"/>
+          <a:chOff x="0" y="0"/>
+          <a:chExt cx="0" cy="0"/>
+        </a:xfrm>
+      </p:grpSpPr>
+      <p:sp>
+        <p:nvSpPr>
+          <p:cNvPr id="2" name="Title 1">
+            <a:extLst>
+              <a:ext uri="{FF2B5EF4-FFF2-40B4-BE49-F238E27FC236}">
+                <a16:creationId xmlns:a16="http://schemas.microsoft.com/office/drawing/2014/main" id="{AA1D01BA-A16A-13E8-3ED3-A729145371A8}"/>
+              </a:ext>
+            </a:extLst>
+          </p:cNvPr>
+          <p:cNvSpPr>
+            <a:spLocks noGrp="1"/>
+          </p:cNvSpPr>
+          <p:nvPr>
+            <p:ph type="title"/>
+          </p:nvPr>
+        </p:nvSpPr>
+        <p:spPr>
+          <a:xfrm>
+            <a:off x="581193" y="729658"/>
+            <a:ext cx="11029616" cy="988332"/>
+          </a:xfrm>
+        </p:spPr>
+        <p:txBody>
+          <a:bodyPr anchor="b">
+            <a:normAutofit/>
+          </a:bodyPr>
+          <a:lstStyle/>
+          <a:p>
+            <a:r>
+              <a:rPr lang="en-GB" dirty="0"/>
+              <a:t>Getting started</a:t>
+            </a:r>
+          </a:p>
+        </p:txBody>
+      </p:sp>
+      <p:sp>
+        <p:nvSpPr>
+          <p:cNvPr id="3" name="Content Placeholder 2">
+            <a:extLst>
+              <a:ext uri="{FF2B5EF4-FFF2-40B4-BE49-F238E27FC236}">
+                <a16:creationId xmlns:a16="http://schemas.microsoft.com/office/drawing/2014/main" id="{7CE7E619-EFAD-C1A0-003D-51D573EC469D}"/>
+              </a:ext>
+            </a:extLst>
+          </p:cNvPr>
+          <p:cNvSpPr>
+            <a:spLocks noGrp="1"/>
+          </p:cNvSpPr>
+          <p:nvPr>
+            <p:ph sz="half" idx="1"/>
+          </p:nvPr>
+        </p:nvSpPr>
+        <p:spPr>
+          <a:xfrm>
+            <a:off x="581193" y="2228003"/>
+            <a:ext cx="5422390" cy="3633047"/>
+          </a:xfrm>
+        </p:spPr>
+        <p:txBody>
+          <a:bodyPr anchor="ctr">
+            <a:normAutofit/>
+          </a:bodyPr>
+          <a:lstStyle/>
+          <a:p>
+            <a:pPr>
+              <a:buFont typeface="Arial" panose="020B0604020202020204" pitchFamily="34" charset="0"/>
+              <a:buChar char="•"/>
+            </a:pPr>
+            <a:r>
+              <a:rPr lang="en-GB" b="1" dirty="0"/>
+              <a:t>Optional Stretch Goals:</a:t>
+            </a:r>
+            <a:br>
+              <a:rPr lang="en-GB" b="1" dirty="0"/>
+            </a:br>
+            <a:br>
+              <a:rPr lang="en-GB" b="1" dirty="0"/>
+            </a:br>
+            <a:r>
+              <a:rPr lang="en-GB" dirty="0"/>
+              <a:t>Deploy your app.</a:t>
+            </a:r>
+          </a:p>
+          <a:p>
+            <a:pPr>
+              <a:buFont typeface="Arial" panose="020B0604020202020204" pitchFamily="34" charset="0"/>
+              <a:buChar char="•"/>
+            </a:pPr>
+            <a:r>
+              <a:rPr lang="en-GB" dirty="0"/>
+              <a:t>Add extra features or documentation.</a:t>
+            </a:r>
+          </a:p>
+        </p:txBody>
+      </p:sp>
+    </p:spTree>
+    <p:extLst>
+      <p:ext uri="{BB962C8B-B14F-4D97-AF65-F5344CB8AC3E}">
+        <p14:creationId xmlns:p14="http://schemas.microsoft.com/office/powerpoint/2010/main" val="4064428533"/>
+      </p:ext>
+    </p:extLst>
+  </p:cSld>
+  <p:clrMapOvr>
+    <a:masterClrMapping/>
+  </p:clrMapOvr>
+</p:sld>
+</file>
+
+<file path=ppt/slides/slide12.xml><?xml version="1.0" encoding="utf-8"?>
 <p:sld xmlns:a="http://schemas.openxmlformats.org/drawingml/2006/main" xmlns:r="http://schemas.openxmlformats.org/officeDocument/2006/relationships" xmlns:p="http://schemas.openxmlformats.org/presentationml/2006/main">
   <p:cSld>
     <p:spTree>
@@ -5712,7 +5785,7 @@
           <a:p>
             <a:r>
               <a:rPr lang="en-GB" dirty="0"/>
-              <a:t>Conclusion</a:t>
+              <a:t>A word of warning…</a:t>
             </a:r>
           </a:p>
         </p:txBody>
@@ -5736,7 +5809,7 @@
         <p:spPr>
           <a:xfrm>
             <a:off x="581192" y="2110773"/>
-            <a:ext cx="5198285" cy="3633047"/>
+            <a:ext cx="9908132" cy="3633047"/>
           </a:xfrm>
         </p:spPr>
         <p:txBody>
@@ -5747,78 +5820,67 @@
           <a:p>
             <a:r>
               <a:rPr lang="en-GB" b="1" dirty="0"/>
-              <a:t>React</a:t>
+              <a:t>Keep a close eye on time: </a:t>
             </a:r>
             <a:r>
               <a:rPr lang="en-GB" dirty="0"/>
-              <a:t>: </a:t>
-            </a:r>
-            <a:br>
+              <a:t>focus on your key features and work backwards</a:t>
+            </a:r>
+          </a:p>
+          <a:p>
+            <a:r>
+              <a:rPr lang="en-GB" b="1" dirty="0"/>
+              <a:t>Time-box regularly</a:t>
+            </a:r>
+            <a:r>
               <a:rPr lang="en-GB" dirty="0"/>
-            </a:br>
+              <a:t>: It’s essential to ensure that time is being spent on the right tasks</a:t>
+            </a:r>
+          </a:p>
+          <a:p>
+            <a:r>
+              <a:rPr lang="en-GB" b="1" dirty="0"/>
+              <a:t>Utilisation</a:t>
+            </a:r>
             <a:r>
               <a:rPr lang="en-GB" dirty="0"/>
-              <a:t>A powerful library for building user interfaces.</a:t>
+              <a:t>: Ensure everyone is utilised and participating</a:t>
             </a:r>
           </a:p>
           <a:p>
             <a:r>
               <a:rPr lang="en-GB" b="1" dirty="0"/>
-              <a:t>Benefits</a:t>
+              <a:t>Prototyping</a:t>
             </a:r>
             <a:r>
               <a:rPr lang="en-GB" dirty="0"/>
-              <a:t>: </a:t>
-            </a:r>
-            <a:br>
+              <a:t>: Quick prototypes can prove concepts and save time</a:t>
+            </a:r>
+          </a:p>
+          <a:p>
+            <a:r>
+              <a:rPr lang="en-GB" b="1" dirty="0"/>
+              <a:t>Check in regularly: </a:t>
+            </a:r>
+            <a:r>
               <a:rPr lang="en-GB" dirty="0"/>
-            </a:br>
+              <a:t>Don’t leave your code merges to the last minute</a:t>
+            </a:r>
+          </a:p>
+          <a:p>
+            <a:r>
+              <a:rPr lang="en-GB" b="1" dirty="0"/>
+              <a:t>Communication is key: </a:t>
+            </a:r>
             <a:r>
               <a:rPr lang="en-GB" dirty="0"/>
-              <a:t>Reusable components, fast rendering with Virtual DOM, and declarative programming.</a:t>
-            </a:r>
-          </a:p>
-          <a:p>
-            <a:r>
-              <a:rPr lang="en-GB" b="1" dirty="0"/>
-              <a:t>Development Tools</a:t>
-            </a:r>
-            <a:r>
-              <a:rPr lang="en-GB" dirty="0"/>
-              <a:t>: </a:t>
-            </a:r>
-            <a:br>
-              <a:rPr lang="en-GB" dirty="0"/>
-            </a:br>
-            <a:r>
-              <a:rPr lang="en-GB" dirty="0"/>
-              <a:t>Use </a:t>
-            </a:r>
-            <a:r>
-              <a:rPr lang="en-GB" dirty="0" err="1"/>
-              <a:t>Vite</a:t>
-            </a:r>
-            <a:r>
-              <a:rPr lang="en-GB" dirty="0"/>
-              <a:t> for faster development and modern features.</a:t>
-            </a:r>
-          </a:p>
-          <a:p>
-            <a:r>
-              <a:rPr lang="en-GB" b="1" dirty="0"/>
-              <a:t>Core Concepts</a:t>
-            </a:r>
-            <a:r>
-              <a:rPr lang="en-GB" dirty="0"/>
-              <a:t>: </a:t>
-            </a:r>
-            <a:br>
-              <a:rPr lang="en-GB" dirty="0"/>
-            </a:br>
-            <a:r>
-              <a:rPr lang="en-GB" dirty="0"/>
-              <a:t>JSX, components, and props are the foundational elements of React.</a:t>
-            </a:r>
+              <a:t>knowing where everyone is and what they’re working on </a:t>
+            </a:r>
+            <a:r>
+              <a:rPr lang="en-GB"/>
+              <a:t>is essential</a:t>
+            </a:r>
+            <a:endParaRPr lang="en-GB" b="1" dirty="0"/>
           </a:p>
         </p:txBody>
       </p:sp>
@@ -5835,7 +5897,7 @@
 </p:sld>
 </file>
 
-<file path=ppt/slides/slide12.xml><?xml version="1.0" encoding="utf-8"?>
+<file path=ppt/slides/slide13.xml><?xml version="1.0" encoding="utf-8"?>
 <p:sld xmlns:a="http://schemas.openxmlformats.org/drawingml/2006/main" xmlns:r="http://schemas.openxmlformats.org/officeDocument/2006/relationships" xmlns:p="http://schemas.openxmlformats.org/presentationml/2006/main">
   <p:cSld>
     <p:spTree>
@@ -5952,7 +6014,7 @@
           <a:p>
             <a:r>
               <a:rPr lang="en-GB" dirty="0"/>
-              <a:t>An Introduction to Building User Interfaces with React</a:t>
+              <a:t>Build, Collaborate, and Present a React Application</a:t>
             </a:r>
           </a:p>
         </p:txBody>
@@ -6007,7 +6069,7 @@
             </a:pPr>
             <a:r>
               <a:rPr lang="en-GB" dirty="0"/>
-              <a:t>The history of React</a:t>
+              <a:t>Introduction to the Challenge</a:t>
             </a:r>
           </a:p>
           <a:p>
@@ -6017,7 +6079,7 @@
             </a:pPr>
             <a:r>
               <a:rPr lang="en-GB" dirty="0"/>
-              <a:t>Installation</a:t>
+              <a:t>Key Learnings</a:t>
             </a:r>
           </a:p>
           <a:p>
@@ -6027,7 +6089,7 @@
             </a:pPr>
             <a:r>
               <a:rPr lang="en-GB" dirty="0"/>
-              <a:t>JSX Expressions</a:t>
+              <a:t>Project Requirements</a:t>
             </a:r>
           </a:p>
           <a:p>
@@ -6037,7 +6099,17 @@
             </a:pPr>
             <a:r>
               <a:rPr lang="en-GB" dirty="0"/>
-              <a:t>Components and Props</a:t>
+              <a:t>Team Structure</a:t>
+            </a:r>
+          </a:p>
+          <a:p>
+            <a:pPr>
+              <a:buFont typeface="+mj-lt"/>
+              <a:buAutoNum type="arabicPeriod"/>
+            </a:pPr>
+            <a:r>
+              <a:rPr lang="en-GB" dirty="0"/>
+              <a:t>Acceptance Criteria</a:t>
             </a:r>
           </a:p>
         </p:txBody>
@@ -6102,7 +6174,7 @@
           <a:p>
             <a:r>
               <a:rPr lang="en-GB" dirty="0"/>
-              <a:t>Who Developed React? A Brief History</a:t>
+              <a:t>Introduction to the Challenge</a:t>
             </a:r>
           </a:p>
         </p:txBody>
@@ -6125,8 +6197,8 @@
         </p:nvSpPr>
         <p:spPr>
           <a:xfrm>
-            <a:off x="581193" y="2228003"/>
-            <a:ext cx="5422390" cy="3633047"/>
+            <a:off x="581192" y="2228003"/>
+            <a:ext cx="5514807" cy="4214838"/>
           </a:xfrm>
         </p:spPr>
         <p:txBody>
@@ -6137,116 +6209,68 @@
           <a:p>
             <a:r>
               <a:rPr lang="en-GB" b="1" dirty="0"/>
-              <a:t>Created by</a:t>
-            </a:r>
-            <a:r>
-              <a:rPr lang="en-GB" dirty="0"/>
-              <a:t>: </a:t>
+              <a:t>Objective:</a:t>
             </a:r>
             <a:br>
               <a:rPr lang="en-GB" dirty="0"/>
             </a:br>
             <a:r>
               <a:rPr lang="en-GB" dirty="0"/>
-              <a:t>Facebook (now Meta) in 2011 for internal use.</a:t>
+              <a:t>Work as a team to design and implement a unique React application using Material Tailwind and other tools.</a:t>
             </a:r>
           </a:p>
           <a:p>
             <a:r>
               <a:rPr lang="en-GB" b="1" dirty="0"/>
-              <a:t>Open-Sourced</a:t>
-            </a:r>
+              <a:t>Focus Areas:</a:t>
+            </a:r>
+            <a:endParaRPr lang="en-GB" dirty="0"/>
+          </a:p>
+          <a:p>
+            <a:pPr>
+              <a:buFont typeface="Arial" panose="020B0604020202020204" pitchFamily="34" charset="0"/>
+              <a:buChar char="•"/>
+            </a:pPr>
             <a:r>
               <a:rPr lang="en-GB" dirty="0"/>
-              <a:t>: </a:t>
+              <a:t>Collaboration and teamwork.</a:t>
+            </a:r>
+          </a:p>
+          <a:p>
+            <a:pPr>
+              <a:buFont typeface="Arial" panose="020B0604020202020204" pitchFamily="34" charset="0"/>
+              <a:buChar char="•"/>
+            </a:pPr>
+            <a:r>
+              <a:rPr lang="en-GB" dirty="0"/>
+              <a:t>Rapid prototyping of responsive, functional user interfaces.</a:t>
+            </a:r>
+          </a:p>
+          <a:p>
+            <a:pPr>
+              <a:buFont typeface="Arial" panose="020B0604020202020204" pitchFamily="34" charset="0"/>
+              <a:buChar char="•"/>
+            </a:pPr>
+            <a:r>
+              <a:rPr lang="en-GB" dirty="0"/>
+              <a:t>Effective use of React and third-party libraries.</a:t>
+            </a:r>
+          </a:p>
+          <a:p>
+            <a:r>
+              <a:rPr lang="en-GB" b="1" dirty="0"/>
+              <a:t>Deliverable:</a:t>
             </a:r>
             <a:br>
               <a:rPr lang="en-GB" dirty="0"/>
             </a:br>
             <a:r>
               <a:rPr lang="en-GB" dirty="0"/>
-              <a:t>Released to the public in 2013.</a:t>
-            </a:r>
-          </a:p>
-          <a:p>
-            <a:r>
-              <a:rPr lang="en-GB" b="1" dirty="0"/>
-              <a:t>Widespread Use</a:t>
-            </a:r>
-            <a:r>
-              <a:rPr lang="en-GB" dirty="0"/>
-              <a:t>: </a:t>
-            </a:r>
-            <a:br>
-              <a:rPr lang="en-GB" dirty="0"/>
-            </a:br>
-            <a:r>
-              <a:rPr lang="en-GB" dirty="0"/>
-              <a:t>Adopted by many companies worldwide due to its efficiency and flexibility.</a:t>
-            </a:r>
-          </a:p>
-        </p:txBody>
-      </p:sp>
-      <p:pic>
-        <p:nvPicPr>
-          <p:cNvPr id="5" name="Picture 4">
-            <a:extLst>
-              <a:ext uri="{FF2B5EF4-FFF2-40B4-BE49-F238E27FC236}">
-                <a16:creationId xmlns:a16="http://schemas.microsoft.com/office/drawing/2014/main" id="{19C6FC25-64E6-B86B-3F90-33AFF7222067}"/>
-              </a:ext>
-            </a:extLst>
-          </p:cNvPr>
-          <p:cNvPicPr>
-            <a:picLocks noChangeAspect="1"/>
-          </p:cNvPicPr>
-          <p:nvPr/>
-        </p:nvPicPr>
-        <p:blipFill>
-          <a:blip r:embed="rId3"/>
-          <a:stretch>
-            <a:fillRect/>
-          </a:stretch>
-        </p:blipFill>
-        <p:spPr>
-          <a:xfrm>
-            <a:off x="8004007" y="4044526"/>
-            <a:ext cx="3606800" cy="2247900"/>
-          </a:xfrm>
-          <a:prstGeom prst="rect">
-            <a:avLst/>
-          </a:prstGeom>
-        </p:spPr>
-      </p:pic>
-      <p:pic>
-        <p:nvPicPr>
-          <p:cNvPr id="6" name="Picture 5">
-            <a:extLst>
-              <a:ext uri="{FF2B5EF4-FFF2-40B4-BE49-F238E27FC236}">
-                <a16:creationId xmlns:a16="http://schemas.microsoft.com/office/drawing/2014/main" id="{9601E492-BF52-083A-EB02-AAC4595C1EB2}"/>
-              </a:ext>
-            </a:extLst>
-          </p:cNvPr>
-          <p:cNvPicPr>
-            <a:picLocks noChangeAspect="1"/>
-          </p:cNvPicPr>
-          <p:nvPr/>
-        </p:nvPicPr>
-        <p:blipFill>
-          <a:blip r:embed="rId4"/>
-          <a:stretch>
-            <a:fillRect/>
-          </a:stretch>
-        </p:blipFill>
-        <p:spPr>
-          <a:xfrm>
-            <a:off x="6188419" y="2449235"/>
-            <a:ext cx="2259553" cy="1959529"/>
-          </a:xfrm>
-          <a:prstGeom prst="rect">
-            <a:avLst/>
-          </a:prstGeom>
-        </p:spPr>
-      </p:pic>
+              <a:t>A functional and responsive app, presented to the group by the end of the session.</a:t>
+            </a:r>
+          </a:p>
+        </p:txBody>
+      </p:sp>
     </p:spTree>
     <p:extLst>
       <p:ext uri="{BB962C8B-B14F-4D97-AF65-F5344CB8AC3E}">
@@ -6313,7 +6337,7 @@
           <a:p>
             <a:r>
               <a:rPr lang="en-GB" dirty="0"/>
-              <a:t>What Problems Does React Solve?</a:t>
+              <a:t>Key Learnings</a:t>
             </a:r>
           </a:p>
         </p:txBody>
@@ -6348,69 +6372,65 @@
           <a:p>
             <a:r>
               <a:rPr lang="en-GB" b="1" dirty="0"/>
-              <a:t>Component Reusability</a:t>
-            </a:r>
+              <a:t>Skills You’ll Develop:</a:t>
+            </a:r>
+          </a:p>
+          <a:p>
+            <a:pPr>
+              <a:buFont typeface="Arial" panose="020B0604020202020204" pitchFamily="34" charset="0"/>
+              <a:buChar char="•"/>
+            </a:pPr>
             <a:r>
               <a:rPr lang="en-GB" dirty="0"/>
-              <a:t>: </a:t>
-            </a:r>
-            <a:br>
+              <a:t>Collaborating and communicating effectively within a team.</a:t>
+            </a:r>
+          </a:p>
+          <a:p>
+            <a:pPr>
+              <a:buFont typeface="Arial" panose="020B0604020202020204" pitchFamily="34" charset="0"/>
+              <a:buChar char="•"/>
+            </a:pPr>
+            <a:r>
               <a:rPr lang="en-GB" dirty="0"/>
-            </a:br>
+              <a:t>Using GitHub for version control and code sharing.</a:t>
+            </a:r>
+          </a:p>
+          <a:p>
+            <a:pPr>
+              <a:buFont typeface="Arial" panose="020B0604020202020204" pitchFamily="34" charset="0"/>
+              <a:buChar char="•"/>
+            </a:pPr>
             <a:r>
               <a:rPr lang="en-GB" dirty="0"/>
-              <a:t>Build reusable components to reduce redundancy and improve maintenance.</a:t>
-            </a:r>
-          </a:p>
-          <a:p>
-            <a:r>
-              <a:rPr lang="en-GB" b="1" dirty="0"/>
-              <a:t>Efficient DOM Manipulation</a:t>
+              <a:t>Leveraging a 3</a:t>
+            </a:r>
+            <a:r>
+              <a:rPr lang="en-GB" baseline="30000" dirty="0"/>
+              <a:t>rd</a:t>
             </a:r>
             <a:r>
               <a:rPr lang="en-GB" dirty="0"/>
-              <a:t>: </a:t>
-            </a:r>
-            <a:br>
+              <a:t> Party UI Library for responsive design and pre-built components.</a:t>
+            </a:r>
+          </a:p>
+          <a:p>
+            <a:pPr>
+              <a:buFont typeface="Arial" panose="020B0604020202020204" pitchFamily="34" charset="0"/>
+              <a:buChar char="•"/>
+            </a:pPr>
+            <a:r>
               <a:rPr lang="en-GB" dirty="0"/>
-            </a:br>
+              <a:t>Managing global state with React Context.</a:t>
+            </a:r>
+          </a:p>
+          <a:p>
+            <a:pPr>
+              <a:buFont typeface="Arial" panose="020B0604020202020204" pitchFamily="34" charset="0"/>
+              <a:buChar char="•"/>
+            </a:pPr>
             <a:r>
               <a:rPr lang="en-GB" dirty="0"/>
-              <a:t>Uses a virtual DOM to optimize UI updates.</a:t>
-            </a:r>
-          </a:p>
-          <a:p>
-            <a:r>
-              <a:rPr lang="en-GB" b="1" dirty="0"/>
-              <a:t>Declarative Syntax</a:t>
-            </a:r>
-            <a:r>
-              <a:rPr lang="en-GB" dirty="0"/>
-              <a:t>: </a:t>
-            </a:r>
-            <a:br>
-              <a:rPr lang="en-GB" dirty="0"/>
-            </a:br>
-            <a:r>
-              <a:rPr lang="en-GB" dirty="0"/>
-              <a:t>Simplifies the process of managing UI states across complex applications.</a:t>
-            </a:r>
-          </a:p>
-          <a:p>
-            <a:r>
-              <a:rPr lang="en-GB" b="1" dirty="0"/>
-              <a:t>Component-Based Architecture</a:t>
-            </a:r>
-            <a:r>
-              <a:rPr lang="en-GB" dirty="0"/>
-              <a:t>: </a:t>
-            </a:r>
-            <a:br>
-              <a:rPr lang="en-GB" dirty="0"/>
-            </a:br>
-            <a:r>
-              <a:rPr lang="en-GB" dirty="0"/>
-              <a:t>Allows developers to build complex UIs by combining simple components.</a:t>
+              <a:t>Integrating APIs and third-party libraries.</a:t>
             </a:r>
           </a:p>
         </p:txBody>
@@ -6481,7 +6501,7 @@
           <a:p>
             <a:r>
               <a:rPr lang="en-GB" dirty="0"/>
-              <a:t>Real-World Use Cases</a:t>
+              <a:t>Project Requirements</a:t>
             </a:r>
           </a:p>
         </p:txBody>
@@ -6515,313 +6535,72 @@
           <a:lstStyle/>
           <a:p>
             <a:r>
+              <a:rPr lang="en-GB" dirty="0"/>
+              <a:t>Your app must meet </a:t>
+            </a:r>
+            <a:r>
               <a:rPr lang="en-GB" b="1" dirty="0"/>
-              <a:t>Social Media</a:t>
+              <a:t>at least one</a:t>
             </a:r>
             <a:r>
               <a:rPr lang="en-GB" dirty="0"/>
-              <a:t>: </a:t>
-            </a:r>
-            <a:br>
+              <a:t> of the following criteria:</a:t>
+            </a:r>
+          </a:p>
+          <a:p>
+            <a:pPr>
+              <a:buFont typeface="+mj-lt"/>
+              <a:buAutoNum type="arabicPeriod"/>
+            </a:pPr>
+            <a:r>
+              <a:rPr lang="en-GB" b="1" dirty="0"/>
+              <a:t>Use a Third-Party API:</a:t>
+            </a:r>
+            <a:r>
               <a:rPr lang="en-GB" dirty="0"/>
-            </a:br>
+              <a:t> Fetch and display data from a public API.</a:t>
+            </a:r>
+          </a:p>
+          <a:p>
+            <a:pPr>
+              <a:buFont typeface="+mj-lt"/>
+              <a:buAutoNum type="arabicPeriod"/>
+            </a:pPr>
+            <a:r>
+              <a:rPr lang="en-GB" b="1" dirty="0"/>
+              <a:t>Integrate a Third-Party Library:</a:t>
+            </a:r>
             <a:r>
               <a:rPr lang="en-GB" dirty="0"/>
-              <a:t>Facebook and Instagram use React for real-time updates.</a:t>
+              <a:t> Add functionality with libraries like charting, maps, or date pickers.</a:t>
             </a:r>
           </a:p>
           <a:p>
             <a:pPr>
-              <a:buFont typeface="Arial" panose="020B0604020202020204" pitchFamily="34" charset="0"/>
-              <a:buChar char="•"/>
+              <a:buFont typeface="+mj-lt"/>
+              <a:buAutoNum type="arabicPeriod"/>
             </a:pPr>
-            <a:endParaRPr lang="en-GB" dirty="0"/>
-          </a:p>
-          <a:p>
             <a:r>
               <a:rPr lang="en-GB" b="1" dirty="0"/>
-              <a:t>E-commerce</a:t>
+              <a:t>Responsive Design:</a:t>
             </a:r>
             <a:r>
               <a:rPr lang="en-GB" dirty="0"/>
-              <a:t>: </a:t>
-            </a:r>
-            <a:br>
+              <a:t> Ensure the app adapts to various screen sizes.</a:t>
+            </a:r>
+          </a:p>
+          <a:p>
+            <a:pPr>
+              <a:buFont typeface="+mj-lt"/>
+              <a:buAutoNum type="arabicPeriod"/>
+            </a:pPr>
+            <a:r>
+              <a:rPr lang="en-GB" b="1" dirty="0"/>
+              <a:t>Use React Context:</a:t>
+            </a:r>
+            <a:r>
               <a:rPr lang="en-GB" dirty="0"/>
-            </a:br>
-            <a:r>
-              <a:rPr lang="en-GB" dirty="0"/>
-              <a:t>Sites like Amazon and Shopify for a dynamic, responsive user experience.</a:t>
-            </a:r>
-          </a:p>
-        </p:txBody>
-      </p:sp>
-      <p:sp>
-        <p:nvSpPr>
-          <p:cNvPr id="4" name="Content Placeholder 2">
-            <a:extLst>
-              <a:ext uri="{FF2B5EF4-FFF2-40B4-BE49-F238E27FC236}">
-                <a16:creationId xmlns:a16="http://schemas.microsoft.com/office/drawing/2014/main" id="{EBC2D2F4-82A7-9F9C-AE8D-5394A4B9D295}"/>
-              </a:ext>
-            </a:extLst>
-          </p:cNvPr>
-          <p:cNvSpPr txBox="1">
-            <a:spLocks/>
-          </p:cNvSpPr>
-          <p:nvPr/>
-        </p:nvSpPr>
-        <p:spPr>
-          <a:xfrm>
-            <a:off x="5842922" y="2363256"/>
-            <a:ext cx="5422390" cy="3633047"/>
-          </a:xfrm>
-          <a:prstGeom prst="rect">
-            <a:avLst/>
-          </a:prstGeom>
-        </p:spPr>
-        <p:txBody>
-          <a:bodyPr vert="horz" lIns="91440" tIns="45720" rIns="91440" bIns="45720" rtlCol="0" anchor="ctr">
-            <a:normAutofit/>
-          </a:bodyPr>
-          <a:lstStyle>
-            <a:lvl1pPr marL="306000" indent="-306000" algn="l" defTabSz="457200" rtl="0" eaLnBrk="1" latinLnBrk="0" hangingPunct="1">
-              <a:spcBef>
-                <a:spcPct val="20000"/>
-              </a:spcBef>
-              <a:spcAft>
-                <a:spcPts val="600"/>
-              </a:spcAft>
-              <a:buClr>
-                <a:schemeClr val="accent2"/>
-              </a:buClr>
-              <a:buSzPct val="92000"/>
-              <a:buFont typeface="Wingdings 2" panose="05020102010507070707" pitchFamily="18" charset="2"/>
-              <a:buChar char=""/>
-              <a:defRPr sz="1800" kern="1200">
-                <a:solidFill>
-                  <a:schemeClr val="tx2"/>
-                </a:solidFill>
-                <a:latin typeface="+mn-lt"/>
-                <a:ea typeface="+mn-ea"/>
-                <a:cs typeface="+mn-cs"/>
-              </a:defRPr>
-            </a:lvl1pPr>
-            <a:lvl2pPr marL="630000" indent="-306000" algn="l" defTabSz="457200" rtl="0" eaLnBrk="1" latinLnBrk="0" hangingPunct="1">
-              <a:spcBef>
-                <a:spcPct val="20000"/>
-              </a:spcBef>
-              <a:spcAft>
-                <a:spcPts val="600"/>
-              </a:spcAft>
-              <a:buClr>
-                <a:schemeClr val="accent2"/>
-              </a:buClr>
-              <a:buSzPct val="92000"/>
-              <a:buFont typeface="Wingdings 2" panose="05020102010507070707" pitchFamily="18" charset="2"/>
-              <a:buChar char=""/>
-              <a:defRPr sz="1600" kern="1200">
-                <a:solidFill>
-                  <a:schemeClr val="tx2"/>
-                </a:solidFill>
-                <a:latin typeface="+mn-lt"/>
-                <a:ea typeface="+mn-ea"/>
-                <a:cs typeface="+mn-cs"/>
-              </a:defRPr>
-            </a:lvl2pPr>
-            <a:lvl3pPr marL="900000" indent="-270000" algn="l" defTabSz="457200" rtl="0" eaLnBrk="1" latinLnBrk="0" hangingPunct="1">
-              <a:spcBef>
-                <a:spcPct val="20000"/>
-              </a:spcBef>
-              <a:spcAft>
-                <a:spcPts val="600"/>
-              </a:spcAft>
-              <a:buClr>
-                <a:schemeClr val="accent2"/>
-              </a:buClr>
-              <a:buSzPct val="92000"/>
-              <a:buFont typeface="Wingdings 2" panose="05020102010507070707" pitchFamily="18" charset="2"/>
-              <a:buChar char=""/>
-              <a:defRPr sz="1400" kern="1200">
-                <a:solidFill>
-                  <a:schemeClr val="tx2"/>
-                </a:solidFill>
-                <a:latin typeface="+mn-lt"/>
-                <a:ea typeface="+mn-ea"/>
-                <a:cs typeface="+mn-cs"/>
-              </a:defRPr>
-            </a:lvl3pPr>
-            <a:lvl4pPr marL="1242000" indent="-234000" algn="l" defTabSz="457200" rtl="0" eaLnBrk="1" latinLnBrk="0" hangingPunct="1">
-              <a:spcBef>
-                <a:spcPct val="20000"/>
-              </a:spcBef>
-              <a:spcAft>
-                <a:spcPts val="600"/>
-              </a:spcAft>
-              <a:buClr>
-                <a:schemeClr val="accent2"/>
-              </a:buClr>
-              <a:buSzPct val="92000"/>
-              <a:buFont typeface="Wingdings 2" panose="05020102010507070707" pitchFamily="18" charset="2"/>
-              <a:buChar char=""/>
-              <a:defRPr sz="1200" kern="1200">
-                <a:solidFill>
-                  <a:schemeClr val="tx2"/>
-                </a:solidFill>
-                <a:latin typeface="+mn-lt"/>
-                <a:ea typeface="+mn-ea"/>
-                <a:cs typeface="+mn-cs"/>
-              </a:defRPr>
-            </a:lvl4pPr>
-            <a:lvl5pPr marL="1602000" indent="-234000" algn="l" defTabSz="457200" rtl="0" eaLnBrk="1" latinLnBrk="0" hangingPunct="1">
-              <a:spcBef>
-                <a:spcPct val="20000"/>
-              </a:spcBef>
-              <a:spcAft>
-                <a:spcPts val="600"/>
-              </a:spcAft>
-              <a:buClr>
-                <a:schemeClr val="accent2"/>
-              </a:buClr>
-              <a:buSzPct val="92000"/>
-              <a:buFont typeface="Wingdings 2" panose="05020102010507070707" pitchFamily="18" charset="2"/>
-              <a:buChar char=""/>
-              <a:defRPr sz="1200" kern="1200">
-                <a:solidFill>
-                  <a:schemeClr val="tx2"/>
-                </a:solidFill>
-                <a:latin typeface="+mn-lt"/>
-                <a:ea typeface="+mn-ea"/>
-                <a:cs typeface="+mn-cs"/>
-              </a:defRPr>
-            </a:lvl5pPr>
-            <a:lvl6pPr marL="1900000" indent="-228600" algn="l" defTabSz="457200" rtl="0" eaLnBrk="1" latinLnBrk="0" hangingPunct="1">
-              <a:spcBef>
-                <a:spcPct val="20000"/>
-              </a:spcBef>
-              <a:spcAft>
-                <a:spcPts val="600"/>
-              </a:spcAft>
-              <a:buClr>
-                <a:schemeClr val="accent2"/>
-              </a:buClr>
-              <a:buSzPct val="92000"/>
-              <a:buFont typeface="Wingdings 2" panose="05020102010507070707" pitchFamily="18" charset="2"/>
-              <a:buChar char=""/>
-              <a:defRPr sz="1200" kern="1200">
-                <a:solidFill>
-                  <a:schemeClr val="tx2"/>
-                </a:solidFill>
-                <a:latin typeface="+mn-lt"/>
-                <a:ea typeface="+mn-ea"/>
-                <a:cs typeface="+mn-cs"/>
-              </a:defRPr>
-            </a:lvl6pPr>
-            <a:lvl7pPr marL="2200000" indent="-228600" algn="l" defTabSz="457200" rtl="0" eaLnBrk="1" latinLnBrk="0" hangingPunct="1">
-              <a:spcBef>
-                <a:spcPct val="20000"/>
-              </a:spcBef>
-              <a:spcAft>
-                <a:spcPts val="600"/>
-              </a:spcAft>
-              <a:buClr>
-                <a:schemeClr val="accent2"/>
-              </a:buClr>
-              <a:buSzPct val="92000"/>
-              <a:buFont typeface="Wingdings 2" panose="05020102010507070707" pitchFamily="18" charset="2"/>
-              <a:buChar char=""/>
-              <a:defRPr sz="1200" kern="1200">
-                <a:solidFill>
-                  <a:schemeClr val="tx2"/>
-                </a:solidFill>
-                <a:latin typeface="+mn-lt"/>
-                <a:ea typeface="+mn-ea"/>
-                <a:cs typeface="+mn-cs"/>
-              </a:defRPr>
-            </a:lvl7pPr>
-            <a:lvl8pPr marL="2500000" indent="-228600" algn="l" defTabSz="457200" rtl="0" eaLnBrk="1" latinLnBrk="0" hangingPunct="1">
-              <a:spcBef>
-                <a:spcPct val="20000"/>
-              </a:spcBef>
-              <a:spcAft>
-                <a:spcPts val="600"/>
-              </a:spcAft>
-              <a:buClr>
-                <a:schemeClr val="accent2"/>
-              </a:buClr>
-              <a:buSzPct val="92000"/>
-              <a:buFont typeface="Wingdings 2" panose="05020102010507070707" pitchFamily="18" charset="2"/>
-              <a:buChar char=""/>
-              <a:defRPr sz="1200" kern="1200">
-                <a:solidFill>
-                  <a:schemeClr val="tx2"/>
-                </a:solidFill>
-                <a:latin typeface="+mn-lt"/>
-                <a:ea typeface="+mn-ea"/>
-                <a:cs typeface="+mn-cs"/>
-              </a:defRPr>
-            </a:lvl8pPr>
-            <a:lvl9pPr marL="2800000" indent="-228600" algn="l" defTabSz="457200" rtl="0" eaLnBrk="1" latinLnBrk="0" hangingPunct="1">
-              <a:spcBef>
-                <a:spcPct val="20000"/>
-              </a:spcBef>
-              <a:spcAft>
-                <a:spcPts val="600"/>
-              </a:spcAft>
-              <a:buClr>
-                <a:schemeClr val="accent2"/>
-              </a:buClr>
-              <a:buSzPct val="92000"/>
-              <a:buFont typeface="Wingdings 2" panose="05020102010507070707" pitchFamily="18" charset="2"/>
-              <a:buChar char=""/>
-              <a:defRPr sz="1200" kern="1200">
-                <a:solidFill>
-                  <a:schemeClr val="tx2"/>
-                </a:solidFill>
-                <a:latin typeface="+mn-lt"/>
-                <a:ea typeface="+mn-ea"/>
-                <a:cs typeface="+mn-cs"/>
-              </a:defRPr>
-            </a:lvl9pPr>
-          </a:lstStyle>
-          <a:p>
-            <a:r>
-              <a:rPr lang="en-GB" b="1" dirty="0"/>
-              <a:t>Media and Streaming</a:t>
-            </a:r>
-            <a:r>
-              <a:rPr lang="en-GB" dirty="0"/>
-              <a:t>: </a:t>
-            </a:r>
-            <a:br>
-              <a:rPr lang="en-GB" dirty="0"/>
-            </a:br>
-            <a:r>
-              <a:rPr lang="en-GB" dirty="0"/>
-              <a:t>Netflix, Airbnb, and other platforms use React for a smooth, user-friendly interface.</a:t>
-            </a:r>
-          </a:p>
-          <a:p>
-            <a:pPr>
-              <a:buFont typeface="Arial" panose="020B0604020202020204" pitchFamily="34" charset="0"/>
-              <a:buChar char="•"/>
-            </a:pPr>
-            <a:endParaRPr lang="en-GB" dirty="0"/>
-          </a:p>
-          <a:p>
-            <a:r>
-              <a:rPr lang="en-GB" b="1" dirty="0"/>
-              <a:t>Business Tools</a:t>
-            </a:r>
-            <a:r>
-              <a:rPr lang="en-GB" dirty="0"/>
-              <a:t>: </a:t>
-            </a:r>
-            <a:br>
-              <a:rPr lang="en-GB" dirty="0"/>
-            </a:br>
-            <a:r>
-              <a:rPr lang="en-GB" dirty="0"/>
-              <a:t>Used by companies like Slack and Salesforce to build responsive dashboards and data visualization tools.</a:t>
+              <a:t> Manage and share state effectively across components.</a:t>
             </a:r>
           </a:p>
         </p:txBody>
@@ -6891,10 +6670,9 @@
           <a:lstStyle/>
           <a:p>
             <a:r>
-              <a:rPr lang="en-GB" b="1" dirty="0"/>
-              <a:t>Pros and Cons of React</a:t>
-            </a:r>
-            <a:endParaRPr lang="en-GB" dirty="0"/>
+              <a:rPr lang="en-GB" dirty="0"/>
+              <a:t>Team Structure</a:t>
+            </a:r>
           </a:p>
         </p:txBody>
       </p:sp>
@@ -6926,23 +6704,17 @@
           </a:bodyPr>
           <a:lstStyle/>
           <a:p>
-            <a:r>
-              <a:rPr lang="en-GB" b="1" dirty="0"/>
-              <a:t>Pros</a:t>
-            </a:r>
-            <a:r>
-              <a:rPr lang="en-GB" dirty="0"/>
-              <a:t>:</a:t>
-            </a:r>
-          </a:p>
-          <a:p>
             <a:pPr>
               <a:buFont typeface="Arial" panose="020B0604020202020204" pitchFamily="34" charset="0"/>
               <a:buChar char="•"/>
             </a:pPr>
             <a:r>
+              <a:rPr lang="en-GB" b="1" dirty="0"/>
+              <a:t>Team Size:</a:t>
+            </a:r>
+            <a:r>
               <a:rPr lang="en-GB" dirty="0"/>
-              <a:t>Component Reusability</a:t>
+              <a:t> 3 members</a:t>
             </a:r>
           </a:p>
           <a:p>
@@ -6951,8 +6723,12 @@
               <a:buChar char="•"/>
             </a:pPr>
             <a:r>
+              <a:rPr lang="en-GB" b="1" dirty="0"/>
+              <a:t>Time Limit:</a:t>
+            </a:r>
+            <a:r>
               <a:rPr lang="en-GB" dirty="0"/>
-              <a:t>Virtual DOM for better performance</a:t>
+              <a:t> 3 hours</a:t>
             </a:r>
           </a:p>
           <a:p>
@@ -6961,287 +6737,12 @@
               <a:buChar char="•"/>
             </a:pPr>
             <a:r>
+              <a:rPr lang="en-GB" b="1" dirty="0"/>
+              <a:t>Presentation:</a:t>
+            </a:r>
+            <a:r>
               <a:rPr lang="en-GB" dirty="0"/>
-              <a:t>Strong ecosystem and community</a:t>
-            </a:r>
-          </a:p>
-          <a:p>
-            <a:pPr>
-              <a:buFont typeface="Arial" panose="020B0604020202020204" pitchFamily="34" charset="0"/>
-              <a:buChar char="•"/>
-            </a:pPr>
-            <a:r>
-              <a:rPr lang="en-GB" dirty="0"/>
-              <a:t>Easy integration with other libraries</a:t>
-            </a:r>
-          </a:p>
-        </p:txBody>
-      </p:sp>
-      <p:sp>
-        <p:nvSpPr>
-          <p:cNvPr id="4" name="Content Placeholder 2">
-            <a:extLst>
-              <a:ext uri="{FF2B5EF4-FFF2-40B4-BE49-F238E27FC236}">
-                <a16:creationId xmlns:a16="http://schemas.microsoft.com/office/drawing/2014/main" id="{46B2BAF1-04E0-9724-3D0F-94BB4E898FA6}"/>
-              </a:ext>
-            </a:extLst>
-          </p:cNvPr>
-          <p:cNvSpPr txBox="1">
-            <a:spLocks/>
-          </p:cNvSpPr>
-          <p:nvPr/>
-        </p:nvSpPr>
-        <p:spPr>
-          <a:xfrm>
-            <a:off x="5503556" y="2190326"/>
-            <a:ext cx="5422390" cy="3633047"/>
-          </a:xfrm>
-          <a:prstGeom prst="rect">
-            <a:avLst/>
-          </a:prstGeom>
-        </p:spPr>
-        <p:txBody>
-          <a:bodyPr vert="horz" lIns="91440" tIns="45720" rIns="91440" bIns="45720" rtlCol="0" anchor="ctr">
-            <a:normAutofit/>
-          </a:bodyPr>
-          <a:lstStyle>
-            <a:lvl1pPr marL="306000" indent="-306000" algn="l" defTabSz="457200" rtl="0" eaLnBrk="1" latinLnBrk="0" hangingPunct="1">
-              <a:spcBef>
-                <a:spcPct val="20000"/>
-              </a:spcBef>
-              <a:spcAft>
-                <a:spcPts val="600"/>
-              </a:spcAft>
-              <a:buClr>
-                <a:schemeClr val="accent2"/>
-              </a:buClr>
-              <a:buSzPct val="92000"/>
-              <a:buFont typeface="Wingdings 2" panose="05020102010507070707" pitchFamily="18" charset="2"/>
-              <a:buChar char=""/>
-              <a:defRPr sz="1800" kern="1200">
-                <a:solidFill>
-                  <a:schemeClr val="tx2"/>
-                </a:solidFill>
-                <a:latin typeface="+mn-lt"/>
-                <a:ea typeface="+mn-ea"/>
-                <a:cs typeface="+mn-cs"/>
-              </a:defRPr>
-            </a:lvl1pPr>
-            <a:lvl2pPr marL="630000" indent="-306000" algn="l" defTabSz="457200" rtl="0" eaLnBrk="1" latinLnBrk="0" hangingPunct="1">
-              <a:spcBef>
-                <a:spcPct val="20000"/>
-              </a:spcBef>
-              <a:spcAft>
-                <a:spcPts val="600"/>
-              </a:spcAft>
-              <a:buClr>
-                <a:schemeClr val="accent2"/>
-              </a:buClr>
-              <a:buSzPct val="92000"/>
-              <a:buFont typeface="Wingdings 2" panose="05020102010507070707" pitchFamily="18" charset="2"/>
-              <a:buChar char=""/>
-              <a:defRPr sz="1600" kern="1200">
-                <a:solidFill>
-                  <a:schemeClr val="tx2"/>
-                </a:solidFill>
-                <a:latin typeface="+mn-lt"/>
-                <a:ea typeface="+mn-ea"/>
-                <a:cs typeface="+mn-cs"/>
-              </a:defRPr>
-            </a:lvl2pPr>
-            <a:lvl3pPr marL="900000" indent="-270000" algn="l" defTabSz="457200" rtl="0" eaLnBrk="1" latinLnBrk="0" hangingPunct="1">
-              <a:spcBef>
-                <a:spcPct val="20000"/>
-              </a:spcBef>
-              <a:spcAft>
-                <a:spcPts val="600"/>
-              </a:spcAft>
-              <a:buClr>
-                <a:schemeClr val="accent2"/>
-              </a:buClr>
-              <a:buSzPct val="92000"/>
-              <a:buFont typeface="Wingdings 2" panose="05020102010507070707" pitchFamily="18" charset="2"/>
-              <a:buChar char=""/>
-              <a:defRPr sz="1400" kern="1200">
-                <a:solidFill>
-                  <a:schemeClr val="tx2"/>
-                </a:solidFill>
-                <a:latin typeface="+mn-lt"/>
-                <a:ea typeface="+mn-ea"/>
-                <a:cs typeface="+mn-cs"/>
-              </a:defRPr>
-            </a:lvl3pPr>
-            <a:lvl4pPr marL="1242000" indent="-234000" algn="l" defTabSz="457200" rtl="0" eaLnBrk="1" latinLnBrk="0" hangingPunct="1">
-              <a:spcBef>
-                <a:spcPct val="20000"/>
-              </a:spcBef>
-              <a:spcAft>
-                <a:spcPts val="600"/>
-              </a:spcAft>
-              <a:buClr>
-                <a:schemeClr val="accent2"/>
-              </a:buClr>
-              <a:buSzPct val="92000"/>
-              <a:buFont typeface="Wingdings 2" panose="05020102010507070707" pitchFamily="18" charset="2"/>
-              <a:buChar char=""/>
-              <a:defRPr sz="1200" kern="1200">
-                <a:solidFill>
-                  <a:schemeClr val="tx2"/>
-                </a:solidFill>
-                <a:latin typeface="+mn-lt"/>
-                <a:ea typeface="+mn-ea"/>
-                <a:cs typeface="+mn-cs"/>
-              </a:defRPr>
-            </a:lvl4pPr>
-            <a:lvl5pPr marL="1602000" indent="-234000" algn="l" defTabSz="457200" rtl="0" eaLnBrk="1" latinLnBrk="0" hangingPunct="1">
-              <a:spcBef>
-                <a:spcPct val="20000"/>
-              </a:spcBef>
-              <a:spcAft>
-                <a:spcPts val="600"/>
-              </a:spcAft>
-              <a:buClr>
-                <a:schemeClr val="accent2"/>
-              </a:buClr>
-              <a:buSzPct val="92000"/>
-              <a:buFont typeface="Wingdings 2" panose="05020102010507070707" pitchFamily="18" charset="2"/>
-              <a:buChar char=""/>
-              <a:defRPr sz="1200" kern="1200">
-                <a:solidFill>
-                  <a:schemeClr val="tx2"/>
-                </a:solidFill>
-                <a:latin typeface="+mn-lt"/>
-                <a:ea typeface="+mn-ea"/>
-                <a:cs typeface="+mn-cs"/>
-              </a:defRPr>
-            </a:lvl5pPr>
-            <a:lvl6pPr marL="1900000" indent="-228600" algn="l" defTabSz="457200" rtl="0" eaLnBrk="1" latinLnBrk="0" hangingPunct="1">
-              <a:spcBef>
-                <a:spcPct val="20000"/>
-              </a:spcBef>
-              <a:spcAft>
-                <a:spcPts val="600"/>
-              </a:spcAft>
-              <a:buClr>
-                <a:schemeClr val="accent2"/>
-              </a:buClr>
-              <a:buSzPct val="92000"/>
-              <a:buFont typeface="Wingdings 2" panose="05020102010507070707" pitchFamily="18" charset="2"/>
-              <a:buChar char=""/>
-              <a:defRPr sz="1200" kern="1200">
-                <a:solidFill>
-                  <a:schemeClr val="tx2"/>
-                </a:solidFill>
-                <a:latin typeface="+mn-lt"/>
-                <a:ea typeface="+mn-ea"/>
-                <a:cs typeface="+mn-cs"/>
-              </a:defRPr>
-            </a:lvl6pPr>
-            <a:lvl7pPr marL="2200000" indent="-228600" algn="l" defTabSz="457200" rtl="0" eaLnBrk="1" latinLnBrk="0" hangingPunct="1">
-              <a:spcBef>
-                <a:spcPct val="20000"/>
-              </a:spcBef>
-              <a:spcAft>
-                <a:spcPts val="600"/>
-              </a:spcAft>
-              <a:buClr>
-                <a:schemeClr val="accent2"/>
-              </a:buClr>
-              <a:buSzPct val="92000"/>
-              <a:buFont typeface="Wingdings 2" panose="05020102010507070707" pitchFamily="18" charset="2"/>
-              <a:buChar char=""/>
-              <a:defRPr sz="1200" kern="1200">
-                <a:solidFill>
-                  <a:schemeClr val="tx2"/>
-                </a:solidFill>
-                <a:latin typeface="+mn-lt"/>
-                <a:ea typeface="+mn-ea"/>
-                <a:cs typeface="+mn-cs"/>
-              </a:defRPr>
-            </a:lvl7pPr>
-            <a:lvl8pPr marL="2500000" indent="-228600" algn="l" defTabSz="457200" rtl="0" eaLnBrk="1" latinLnBrk="0" hangingPunct="1">
-              <a:spcBef>
-                <a:spcPct val="20000"/>
-              </a:spcBef>
-              <a:spcAft>
-                <a:spcPts val="600"/>
-              </a:spcAft>
-              <a:buClr>
-                <a:schemeClr val="accent2"/>
-              </a:buClr>
-              <a:buSzPct val="92000"/>
-              <a:buFont typeface="Wingdings 2" panose="05020102010507070707" pitchFamily="18" charset="2"/>
-              <a:buChar char=""/>
-              <a:defRPr sz="1200" kern="1200">
-                <a:solidFill>
-                  <a:schemeClr val="tx2"/>
-                </a:solidFill>
-                <a:latin typeface="+mn-lt"/>
-                <a:ea typeface="+mn-ea"/>
-                <a:cs typeface="+mn-cs"/>
-              </a:defRPr>
-            </a:lvl8pPr>
-            <a:lvl9pPr marL="2800000" indent="-228600" algn="l" defTabSz="457200" rtl="0" eaLnBrk="1" latinLnBrk="0" hangingPunct="1">
-              <a:spcBef>
-                <a:spcPct val="20000"/>
-              </a:spcBef>
-              <a:spcAft>
-                <a:spcPts val="600"/>
-              </a:spcAft>
-              <a:buClr>
-                <a:schemeClr val="accent2"/>
-              </a:buClr>
-              <a:buSzPct val="92000"/>
-              <a:buFont typeface="Wingdings 2" panose="05020102010507070707" pitchFamily="18" charset="2"/>
-              <a:buChar char=""/>
-              <a:defRPr sz="1200" kern="1200">
-                <a:solidFill>
-                  <a:schemeClr val="tx2"/>
-                </a:solidFill>
-                <a:latin typeface="+mn-lt"/>
-                <a:ea typeface="+mn-ea"/>
-                <a:cs typeface="+mn-cs"/>
-              </a:defRPr>
-            </a:lvl9pPr>
-          </a:lstStyle>
-          <a:p>
-            <a:r>
-              <a:rPr lang="en-GB" b="1" dirty="0"/>
-              <a:t>Cons</a:t>
-            </a:r>
-            <a:r>
-              <a:rPr lang="en-GB" dirty="0"/>
-              <a:t>:</a:t>
-            </a:r>
-          </a:p>
-          <a:p>
-            <a:pPr marL="742950" lvl="1" indent="-285750">
-              <a:buFont typeface="Arial" panose="020B0604020202020204" pitchFamily="34" charset="0"/>
-              <a:buChar char="•"/>
-            </a:pPr>
-            <a:r>
-              <a:rPr lang="en-GB" dirty="0"/>
-              <a:t>Learning Curve: JSX and component architecture take time to learn</a:t>
-            </a:r>
-          </a:p>
-          <a:p>
-            <a:pPr marL="742950" lvl="1" indent="-285750">
-              <a:buFont typeface="Arial" panose="020B0604020202020204" pitchFamily="34" charset="0"/>
-              <a:buChar char="•"/>
-            </a:pPr>
-            <a:r>
-              <a:rPr lang="en-GB" dirty="0"/>
-              <a:t>JSX Syntax: Can feel non-standard for HTML/CSS developers</a:t>
-            </a:r>
-          </a:p>
-          <a:p>
-            <a:pPr marL="742950" lvl="1" indent="-285750">
-              <a:buFont typeface="Arial" panose="020B0604020202020204" pitchFamily="34" charset="0"/>
-              <a:buChar char="•"/>
-            </a:pPr>
-            <a:r>
-              <a:rPr lang="en-GB" dirty="0"/>
-              <a:t>Frequent Updates: Requires developers to keep up with changes</a:t>
+              <a:t> Showcase your app to the group, explaining your process and contributions.</a:t>
             </a:r>
           </a:p>
         </p:txBody>
@@ -7311,12 +6812,8 @@
           <a:lstStyle/>
           <a:p>
             <a:r>
-              <a:rPr lang="en-GB" dirty="0" err="1"/>
-              <a:t>Vite</a:t>
-            </a:r>
-            <a:r>
               <a:rPr lang="en-GB" dirty="0"/>
-              <a:t> vs. Create React App (CRA)</a:t>
+              <a:t>Acceptance Criteria</a:t>
             </a:r>
           </a:p>
         </p:txBody>
@@ -7340,134 +6837,131 @@
         <p:spPr>
           <a:xfrm>
             <a:off x="581193" y="2228003"/>
-            <a:ext cx="5422390" cy="3633047"/>
+            <a:ext cx="5422390" cy="4183307"/>
           </a:xfrm>
         </p:spPr>
         <p:txBody>
           <a:bodyPr anchor="ctr">
-            <a:normAutofit lnSpcReduction="10000"/>
+            <a:normAutofit fontScale="92500" lnSpcReduction="10000"/>
           </a:bodyPr>
           <a:lstStyle/>
           <a:p>
             <a:r>
               <a:rPr lang="en-GB" b="1" dirty="0"/>
-              <a:t>Create React App (CRA)</a:t>
+              <a:t>To successfully complete the challenge, your app must:</a:t>
+            </a:r>
+          </a:p>
+          <a:p>
+            <a:pPr>
+              <a:buFont typeface="+mj-lt"/>
+              <a:buAutoNum type="arabicPeriod"/>
+            </a:pPr>
+            <a:r>
+              <a:rPr lang="en-GB" b="1" dirty="0"/>
+              <a:t>Idea and Planning:</a:t>
             </a:r>
             <a:r>
               <a:rPr lang="en-GB" dirty="0"/>
-              <a:t>:</a:t>
-            </a:r>
-          </a:p>
-          <a:p>
-            <a:pPr marL="742950" lvl="1" indent="-285750">
-              <a:buFont typeface="Arial" panose="020B0604020202020204" pitchFamily="34" charset="0"/>
-              <a:buChar char="•"/>
-            </a:pPr>
-            <a:r>
-              <a:rPr lang="en-GB" dirty="0"/>
-              <a:t>Traditional React setup tool.</a:t>
-            </a:r>
-          </a:p>
-          <a:p>
-            <a:pPr marL="742950" lvl="1" indent="-285750">
-              <a:buFont typeface="Arial" panose="020B0604020202020204" pitchFamily="34" charset="0"/>
-              <a:buChar char="•"/>
-            </a:pPr>
-            <a:r>
-              <a:rPr lang="en-GB" dirty="0"/>
-              <a:t>Easy to use but can be slow due to bundling.</a:t>
-            </a:r>
-          </a:p>
-          <a:p>
-            <a:r>
-              <a:rPr lang="en-GB" b="1" dirty="0" err="1"/>
-              <a:t>Vite</a:t>
-            </a:r>
-            <a:r>
-              <a:rPr lang="en-GB" dirty="0"/>
-              <a:t>:</a:t>
-            </a:r>
-          </a:p>
-          <a:p>
-            <a:pPr marL="742950" lvl="1" indent="-285750">
-              <a:buFont typeface="Arial" panose="020B0604020202020204" pitchFamily="34" charset="0"/>
-              <a:buChar char="•"/>
-            </a:pPr>
-            <a:r>
-              <a:rPr lang="en-GB" dirty="0"/>
-              <a:t>Modern development tool for fast builds and hot module replacement.</a:t>
-            </a:r>
-          </a:p>
-          <a:p>
-            <a:pPr marL="742950" lvl="1" indent="-285750">
-              <a:buFont typeface="Arial" panose="020B0604020202020204" pitchFamily="34" charset="0"/>
-              <a:buChar char="•"/>
-            </a:pPr>
-            <a:r>
-              <a:rPr lang="en-GB" dirty="0"/>
-              <a:t>Better suited for larger, complex applications.</a:t>
-            </a:r>
-          </a:p>
-          <a:p>
-            <a:pPr marL="457200" lvl="1" indent="0">
-              <a:buNone/>
-            </a:pPr>
-            <a:endParaRPr lang="en-GB" b="1" dirty="0"/>
-          </a:p>
-          <a:p>
-            <a:pPr marL="418950" indent="-285750"/>
-            <a:r>
-              <a:rPr lang="en-GB" b="1" dirty="0"/>
-              <a:t>Why </a:t>
-            </a:r>
-            <a:r>
-              <a:rPr lang="en-GB" b="1" dirty="0" err="1"/>
-              <a:t>Vite</a:t>
-            </a:r>
-            <a:r>
-              <a:rPr lang="en-GB" b="1" dirty="0"/>
-              <a:t>?</a:t>
+              <a:t> </a:t>
             </a:r>
             <a:br>
               <a:rPr lang="en-GB" dirty="0"/>
             </a:br>
             <a:r>
               <a:rPr lang="en-GB" dirty="0"/>
-              <a:t>Faster initial load times and builds, supports modern JavaScript features.</a:t>
-            </a:r>
-          </a:p>
-        </p:txBody>
-      </p:sp>
-      <p:pic>
-        <p:nvPicPr>
-          <p:cNvPr id="4" name="Picture 3">
-            <a:extLst>
-              <a:ext uri="{FF2B5EF4-FFF2-40B4-BE49-F238E27FC236}">
-                <a16:creationId xmlns:a16="http://schemas.microsoft.com/office/drawing/2014/main" id="{BF992DE8-D129-7E41-2128-EC659595C2EE}"/>
-              </a:ext>
-            </a:extLst>
-          </p:cNvPr>
-          <p:cNvPicPr>
-            <a:picLocks noChangeAspect="1"/>
-          </p:cNvPicPr>
-          <p:nvPr/>
-        </p:nvPicPr>
-        <p:blipFill>
-          <a:blip r:embed="rId2"/>
-          <a:stretch>
-            <a:fillRect/>
-          </a:stretch>
-        </p:blipFill>
-        <p:spPr>
-          <a:xfrm>
-            <a:off x="7354024" y="2798283"/>
-            <a:ext cx="2923112" cy="2880911"/>
-          </a:xfrm>
-          <a:prstGeom prst="rect">
-            <a:avLst/>
-          </a:prstGeom>
-        </p:spPr>
-      </p:pic>
+              <a:t>Brainstorm and outline core functionality as a team.</a:t>
+            </a:r>
+          </a:p>
+          <a:p>
+            <a:pPr>
+              <a:buFont typeface="+mj-lt"/>
+              <a:buAutoNum type="arabicPeriod"/>
+            </a:pPr>
+            <a:r>
+              <a:rPr lang="en-GB" b="1" dirty="0"/>
+              <a:t>GitHub Collaboration:</a:t>
+            </a:r>
+            <a:endParaRPr lang="en-GB" dirty="0"/>
+          </a:p>
+          <a:p>
+            <a:pPr marL="742950" lvl="1" indent="-285750">
+              <a:buFont typeface="+mj-lt"/>
+              <a:buAutoNum type="arabicPeriod"/>
+            </a:pPr>
+            <a:r>
+              <a:rPr lang="en-GB" dirty="0"/>
+              <a:t>Set up a repository.</a:t>
+            </a:r>
+          </a:p>
+          <a:p>
+            <a:pPr marL="742950" lvl="1" indent="-285750">
+              <a:buFont typeface="+mj-lt"/>
+              <a:buAutoNum type="arabicPeriod"/>
+            </a:pPr>
+            <a:r>
+              <a:rPr lang="en-GB" dirty="0"/>
+              <a:t>Follow best practices with branches, commits, and pull requests.</a:t>
+            </a:r>
+          </a:p>
+          <a:p>
+            <a:pPr>
+              <a:buFont typeface="+mj-lt"/>
+              <a:buAutoNum type="arabicPeriod"/>
+            </a:pPr>
+            <a:r>
+              <a:rPr lang="en-GB" b="1" dirty="0"/>
+              <a:t>Implementation:</a:t>
+            </a:r>
+            <a:endParaRPr lang="en-GB" dirty="0"/>
+          </a:p>
+          <a:p>
+            <a:pPr marL="742950" lvl="1" indent="-285750">
+              <a:buFont typeface="+mj-lt"/>
+              <a:buAutoNum type="arabicPeriod"/>
+            </a:pPr>
+            <a:r>
+              <a:rPr lang="en-GB" dirty="0"/>
+              <a:t>Build the app using Material Tailwind.</a:t>
+            </a:r>
+          </a:p>
+          <a:p>
+            <a:pPr marL="742950" lvl="1" indent="-285750">
+              <a:buFont typeface="+mj-lt"/>
+              <a:buAutoNum type="arabicPeriod"/>
+            </a:pPr>
+            <a:r>
+              <a:rPr lang="en-GB" dirty="0" err="1"/>
+              <a:t>Fulfill</a:t>
+            </a:r>
+            <a:r>
+              <a:rPr lang="en-GB" dirty="0"/>
+              <a:t> </a:t>
+            </a:r>
+            <a:r>
+              <a:rPr lang="en-GB" b="1" dirty="0"/>
+              <a:t>at least one</a:t>
+            </a:r>
+            <a:r>
+              <a:rPr lang="en-GB" dirty="0"/>
+              <a:t> of the feature requirements.</a:t>
+            </a:r>
+          </a:p>
+          <a:p>
+            <a:pPr>
+              <a:buFont typeface="+mj-lt"/>
+              <a:buAutoNum type="arabicPeriod"/>
+            </a:pPr>
+            <a:r>
+              <a:rPr lang="en-GB" b="1" dirty="0"/>
+              <a:t>Presentation:</a:t>
+            </a:r>
+            <a:r>
+              <a:rPr lang="en-GB" dirty="0"/>
+              <a:t> Demonstrate functionality and highlight team contributions.</a:t>
+            </a:r>
+          </a:p>
+        </p:txBody>
+      </p:sp>
     </p:spTree>
     <p:extLst>
       <p:ext uri="{BB962C8B-B14F-4D97-AF65-F5344CB8AC3E}">
@@ -7534,13 +7028,8 @@
           <a:p>
             <a:r>
               <a:rPr lang="en-GB" dirty="0"/>
-              <a:t>Creating a New App Using </a:t>
-            </a:r>
-            <a:r>
-              <a:rPr lang="en-GB" dirty="0" err="1"/>
-              <a:t>Vite</a:t>
-            </a:r>
-            <a:endParaRPr lang="en-GB" dirty="0"/>
+              <a:t>Stretch Goals (Optional)</a:t>
+            </a:r>
           </a:p>
         </p:txBody>
       </p:sp>
@@ -7568,184 +7057,82 @@
         </p:spPr>
         <p:txBody>
           <a:bodyPr anchor="ctr">
-            <a:normAutofit lnSpcReduction="10000"/>
+            <a:normAutofit/>
           </a:bodyPr>
           <a:lstStyle/>
           <a:p>
+            <a:pPr>
+              <a:buFont typeface="Arial" panose="020B0604020202020204" pitchFamily="34" charset="0"/>
+              <a:buChar char="•"/>
+            </a:pPr>
             <a:r>
               <a:rPr lang="en-GB" b="1" dirty="0"/>
-              <a:t>Step 1</a:t>
+              <a:t>Deployment:</a:t>
             </a:r>
             <a:r>
               <a:rPr lang="en-GB" dirty="0"/>
-              <a:t>: </a:t>
+              <a:t> </a:t>
             </a:r>
             <a:br>
               <a:rPr lang="en-GB" dirty="0"/>
             </a:br>
             <a:r>
               <a:rPr lang="en-GB" dirty="0"/>
-              <a:t>Install using </a:t>
+              <a:t>Host your app on </a:t>
             </a:r>
             <a:r>
               <a:rPr lang="en-GB" dirty="0" err="1"/>
-              <a:t>Vite</a:t>
+              <a:t>Vercel</a:t>
             </a:r>
             <a:r>
               <a:rPr lang="en-GB" dirty="0"/>
-              <a:t>:</a:t>
+              <a:t>, Netlify, or a similar platform.</a:t>
+            </a:r>
+          </a:p>
+          <a:p>
+            <a:pPr>
+              <a:buFont typeface="Arial" panose="020B0604020202020204" pitchFamily="34" charset="0"/>
+              <a:buChar char="•"/>
+            </a:pPr>
+            <a:r>
+              <a:rPr lang="en-GB" b="1" dirty="0"/>
+              <a:t>Extra Feature:</a:t>
+            </a:r>
+            <a:r>
+              <a:rPr lang="en-GB" dirty="0"/>
+              <a:t> </a:t>
             </a:r>
             <a:br>
               <a:rPr lang="en-GB" dirty="0"/>
             </a:br>
+            <a:r>
+              <a:rPr lang="en-GB" dirty="0"/>
+              <a:t>Add an additional feature to enhance the app.</a:t>
+            </a:r>
+          </a:p>
+          <a:p>
+            <a:pPr>
+              <a:buFont typeface="Arial" panose="020B0604020202020204" pitchFamily="34" charset="0"/>
+              <a:buChar char="•"/>
+            </a:pPr>
+            <a:r>
+              <a:rPr lang="en-GB" b="1" dirty="0"/>
+              <a:t>Documentation:</a:t>
+            </a:r>
+            <a:r>
+              <a:rPr lang="en-GB" dirty="0"/>
+              <a:t> </a:t>
+            </a:r>
             <a:br>
               <a:rPr lang="en-GB" dirty="0"/>
             </a:br>
-            <a:endParaRPr lang="en-GB" dirty="0"/>
-          </a:p>
-          <a:p>
-            <a:r>
-              <a:rPr lang="en-GB" b="1" dirty="0"/>
-              <a:t>Step 2</a:t>
-            </a:r>
             <a:r>
               <a:rPr lang="en-GB" dirty="0"/>
-              <a:t>: </a:t>
-            </a:r>
-            <a:br>
-              <a:rPr lang="en-GB" dirty="0"/>
-            </a:br>
-            <a:r>
-              <a:rPr lang="en-GB" dirty="0"/>
-              <a:t>Navigate to the new project:</a:t>
-            </a:r>
-            <a:br>
-              <a:rPr lang="en-GB" dirty="0"/>
-            </a:br>
-            <a:br>
-              <a:rPr lang="en-GB" dirty="0"/>
-            </a:br>
-            <a:endParaRPr lang="en-GB" dirty="0"/>
-          </a:p>
-          <a:p>
-            <a:r>
-              <a:rPr lang="en-GB" b="1" dirty="0"/>
-              <a:t>Step 3</a:t>
-            </a:r>
-            <a:r>
-              <a:rPr lang="en-GB" dirty="0"/>
-              <a:t>: </a:t>
-            </a:r>
-            <a:br>
-              <a:rPr lang="en-GB" dirty="0"/>
-            </a:br>
-            <a:r>
-              <a:rPr lang="en-GB" dirty="0"/>
-              <a:t>Install dependencies and start the server</a:t>
-            </a:r>
-            <a:br>
-              <a:rPr lang="en-GB" dirty="0"/>
-            </a:br>
-            <a:br>
-              <a:rPr lang="en-GB" dirty="0"/>
-            </a:br>
-            <a:r>
-              <a:rPr lang="en-GB" dirty="0"/>
-              <a:t>demo…</a:t>
-            </a:r>
-          </a:p>
-        </p:txBody>
-      </p:sp>
-      <p:pic>
-        <p:nvPicPr>
-          <p:cNvPr id="6" name="Picture 5">
-            <a:extLst>
-              <a:ext uri="{FF2B5EF4-FFF2-40B4-BE49-F238E27FC236}">
-                <a16:creationId xmlns:a16="http://schemas.microsoft.com/office/drawing/2014/main" id="{10C46F92-95BC-F604-83D6-C9D36675A4A9}"/>
-              </a:ext>
-            </a:extLst>
-          </p:cNvPr>
-          <p:cNvPicPr>
-            <a:picLocks noChangeAspect="1"/>
-          </p:cNvPicPr>
-          <p:nvPr/>
-        </p:nvPicPr>
-        <p:blipFill>
-          <a:blip r:embed="rId2"/>
-          <a:stretch>
-            <a:fillRect/>
-          </a:stretch>
-        </p:blipFill>
-        <p:spPr>
-          <a:xfrm>
-            <a:off x="7221950" y="2440580"/>
-            <a:ext cx="3962400" cy="533400"/>
-          </a:xfrm>
-          <a:prstGeom prst="rect">
-            <a:avLst/>
-          </a:prstGeom>
-        </p:spPr>
-      </p:pic>
-      <p:pic>
-        <p:nvPicPr>
-          <p:cNvPr id="8" name="Picture 7">
-            <a:extLst>
-              <a:ext uri="{FF2B5EF4-FFF2-40B4-BE49-F238E27FC236}">
-                <a16:creationId xmlns:a16="http://schemas.microsoft.com/office/drawing/2014/main" id="{59BE8D89-3411-A6AB-EDD9-A742FC23615F}"/>
-              </a:ext>
-            </a:extLst>
-          </p:cNvPr>
-          <p:cNvPicPr>
-            <a:picLocks noChangeAspect="1"/>
-          </p:cNvPicPr>
-          <p:nvPr/>
-        </p:nvPicPr>
-        <p:blipFill>
-          <a:blip r:embed="rId3"/>
-          <a:stretch>
-            <a:fillRect/>
-          </a:stretch>
-        </p:blipFill>
-        <p:spPr>
-          <a:xfrm>
-            <a:off x="7221950" y="3614675"/>
-            <a:ext cx="2032000" cy="508000"/>
-          </a:xfrm>
-          <a:prstGeom prst="rect">
-            <a:avLst/>
-          </a:prstGeom>
-        </p:spPr>
-      </p:pic>
-      <p:pic>
-        <p:nvPicPr>
-          <p:cNvPr id="10" name="Picture 9" descr="A black background with white text&#10;&#10;Description automatically generated">
-            <a:extLst>
-              <a:ext uri="{FF2B5EF4-FFF2-40B4-BE49-F238E27FC236}">
-                <a16:creationId xmlns:a16="http://schemas.microsoft.com/office/drawing/2014/main" id="{D9C1CDD1-6496-672B-4FCB-60F048238E71}"/>
-              </a:ext>
-            </a:extLst>
-          </p:cNvPr>
-          <p:cNvPicPr>
-            <a:picLocks noChangeAspect="1"/>
-          </p:cNvPicPr>
-          <p:nvPr/>
-        </p:nvPicPr>
-        <p:blipFill>
-          <a:blip r:embed="rId4"/>
-          <a:stretch>
-            <a:fillRect/>
-          </a:stretch>
-        </p:blipFill>
-        <p:spPr>
-          <a:xfrm>
-            <a:off x="7221950" y="4763370"/>
-            <a:ext cx="1714500" cy="838200"/>
-          </a:xfrm>
-          <a:prstGeom prst="rect">
-            <a:avLst/>
-          </a:prstGeom>
-        </p:spPr>
-      </p:pic>
+              <a:t>Write a README with setup instructions and app details.</a:t>
+            </a:r>
+          </a:p>
+        </p:txBody>
+      </p:sp>
     </p:spTree>
     <p:extLst>
       <p:ext uri="{BB962C8B-B14F-4D97-AF65-F5344CB8AC3E}">
@@ -7812,7 +7199,7 @@
           <a:p>
             <a:r>
               <a:rPr lang="en-GB" dirty="0"/>
-              <a:t>Basic JSX Expressions</a:t>
+              <a:t>Getting started</a:t>
             </a:r>
           </a:p>
         </p:txBody>
@@ -7845,98 +7232,61 @@
           </a:bodyPr>
           <a:lstStyle/>
           <a:p>
+            <a:pPr>
+              <a:buFont typeface="Arial" panose="020B0604020202020204" pitchFamily="34" charset="0"/>
+              <a:buChar char="•"/>
+            </a:pPr>
             <a:r>
               <a:rPr lang="en-GB" b="1" dirty="0"/>
-              <a:t>What is JSX?</a:t>
-            </a:r>
+              <a:t>Set Up and Plan:</a:t>
+            </a:r>
+            <a:br>
+              <a:rPr lang="en-GB" b="1" dirty="0"/>
+            </a:br>
             <a:r>
               <a:rPr lang="en-GB" dirty="0"/>
-              <a:t>: </a:t>
+              <a:t>Brainstorm app ideas and assign roles.</a:t>
+            </a:r>
+          </a:p>
+          <a:p>
+            <a:pPr>
+              <a:buFont typeface="Arial" panose="020B0604020202020204" pitchFamily="34" charset="0"/>
+              <a:buChar char="•"/>
+            </a:pPr>
+            <a:r>
+              <a:rPr lang="en-GB" dirty="0"/>
+              <a:t>Outline the project structure and tasks.</a:t>
+            </a:r>
+          </a:p>
+          <a:p>
+            <a:pPr>
+              <a:buFont typeface="Arial" panose="020B0604020202020204" pitchFamily="34" charset="0"/>
+              <a:buChar char="•"/>
+            </a:pPr>
+            <a:r>
+              <a:rPr lang="en-GB" b="1" dirty="0"/>
+              <a:t>Project Setup:</a:t>
             </a:r>
             <a:br>
+              <a:rPr lang="en-GB" b="1" dirty="0"/>
+            </a:br>
+            <a:r>
               <a:rPr lang="en-GB" dirty="0"/>
-            </a:br>
+              <a:t>Use the starter project.</a:t>
+            </a:r>
+          </a:p>
+          <a:p>
+            <a:pPr>
+              <a:buFont typeface="Arial" panose="020B0604020202020204" pitchFamily="34" charset="0"/>
+              <a:buChar char="•"/>
+            </a:pPr>
             <a:r>
               <a:rPr lang="en-GB" dirty="0"/>
-              <a:t>JavaScript syntax extension that looks similar to HTML.</a:t>
-            </a:r>
-          </a:p>
-          <a:p>
-            <a:r>
-              <a:rPr lang="en-GB" b="1" dirty="0"/>
-              <a:t>Embedding JavaScript</a:t>
-            </a:r>
-            <a:r>
-              <a:rPr lang="en-GB" dirty="0"/>
-              <a:t>: </a:t>
-            </a:r>
-            <a:br>
-              <a:rPr lang="en-GB" dirty="0"/>
-            </a:br>
-            <a:r>
-              <a:rPr lang="en-GB" dirty="0"/>
-              <a:t>Use {} to embed JavaScript expressions within JSX.</a:t>
-            </a:r>
-          </a:p>
-          <a:p>
-            <a:r>
-              <a:rPr lang="en-GB" b="1" dirty="0"/>
-              <a:t>Key Concept</a:t>
-            </a:r>
-            <a:r>
-              <a:rPr lang="en-GB" dirty="0"/>
-              <a:t>:</a:t>
-            </a:r>
-            <a:br>
-              <a:rPr lang="en-GB" dirty="0"/>
-            </a:br>
-            <a:r>
-              <a:rPr lang="en-GB" dirty="0"/>
-              <a:t> JSX makes code more readable and allows embedding logic directly in UI definitions.</a:t>
-            </a:r>
-            <a:br>
-              <a:rPr lang="en-GB" dirty="0"/>
-            </a:br>
-            <a:br>
-              <a:rPr lang="en-GB" dirty="0"/>
-            </a:br>
-            <a:r>
-              <a:rPr lang="en-GB" dirty="0"/>
-              <a:t>Demo…</a:t>
-            </a:r>
-          </a:p>
-        </p:txBody>
-      </p:sp>
-      <p:pic>
-        <p:nvPicPr>
-          <p:cNvPr id="5" name="Picture 4" descr="A black background with white text&#10;&#10;Description automatically generated">
-            <a:extLst>
-              <a:ext uri="{FF2B5EF4-FFF2-40B4-BE49-F238E27FC236}">
-                <a16:creationId xmlns:a16="http://schemas.microsoft.com/office/drawing/2014/main" id="{EDDADB95-498F-FF3E-1952-F759B3C5B498}"/>
-              </a:ext>
-            </a:extLst>
-          </p:cNvPr>
-          <p:cNvPicPr>
-            <a:picLocks noChangeAspect="1"/>
-          </p:cNvPicPr>
-          <p:nvPr/>
-        </p:nvPicPr>
-        <p:blipFill>
-          <a:blip r:embed="rId2"/>
-          <a:stretch>
-            <a:fillRect/>
-          </a:stretch>
-        </p:blipFill>
-        <p:spPr>
-          <a:xfrm>
-            <a:off x="6545632" y="3429000"/>
-            <a:ext cx="4762500" cy="749300"/>
-          </a:xfrm>
-          <a:prstGeom prst="rect">
-            <a:avLst/>
-          </a:prstGeom>
-        </p:spPr>
-      </p:pic>
+              <a:t>Set up a GitHub repository for collaboration.</a:t>
+            </a:r>
+          </a:p>
+        </p:txBody>
+      </p:sp>
     </p:spTree>
     <p:extLst>
       <p:ext uri="{BB962C8B-B14F-4D97-AF65-F5344CB8AC3E}">

</xml_diff>